<commit_message>
fragebogen + marker + protokoll
</commit_message>
<xml_diff>
--- a/studies/labor study_A/markertest_2020/pilotA/marker_personA.pptx
+++ b/studies/labor study_A/markertest_2020/pilotA/marker_personA.pptx
@@ -5,19 +5,18 @@
     <p:sldMasterId id="2147483660" r:id="rId1"/>
   </p:sldMasterIdLst>
   <p:notesMasterIdLst>
-    <p:notesMasterId r:id="rId9"/>
+    <p:notesMasterId r:id="rId8"/>
   </p:notesMasterIdLst>
   <p:handoutMasterIdLst>
-    <p:handoutMasterId r:id="rId10"/>
+    <p:handoutMasterId r:id="rId9"/>
   </p:handoutMasterIdLst>
   <p:sldIdLst>
     <p:sldId id="256" r:id="rId2"/>
     <p:sldId id="257" r:id="rId3"/>
-    <p:sldId id="258" r:id="rId4"/>
-    <p:sldId id="259" r:id="rId5"/>
-    <p:sldId id="260" r:id="rId6"/>
-    <p:sldId id="261" r:id="rId7"/>
-    <p:sldId id="262" r:id="rId8"/>
+    <p:sldId id="259" r:id="rId4"/>
+    <p:sldId id="260" r:id="rId5"/>
+    <p:sldId id="261" r:id="rId6"/>
+    <p:sldId id="262" r:id="rId7"/>
   </p:sldIdLst>
   <p:sldSz cx="6858000" cy="9906000" type="A4"/>
   <p:notesSz cx="6669088" cy="9926638"/>
@@ -218,7 +217,7 @@
           <a:p>
             <a:fld id="{3C350E95-D631-46FF-8FBC-25611F4D7317}" type="datetimeFigureOut">
               <a:rPr lang="de-DE" smtClean="0"/>
-              <a:t>28.07.2020</a:t>
+              <a:t>04.08.2020</a:t>
             </a:fld>
             <a:endParaRPr lang="de-DE"/>
           </a:p>
@@ -396,7 +395,7 @@
           <a:p>
             <a:fld id="{7FB9B651-3A4B-4671-82E4-07914D9261A0}" type="datetimeFigureOut">
               <a:rPr lang="de-DE" smtClean="0"/>
-              <a:t>28.07.2020</a:t>
+              <a:t>04.08.2020</a:t>
             </a:fld>
             <a:endParaRPr lang="de-DE"/>
           </a:p>
@@ -795,7 +794,7 @@
           <a:p>
             <a:fld id="{37FD060A-D0AA-4F3A-BDC0-806000406E60}" type="datetime1">
               <a:rPr lang="de-DE" smtClean="0"/>
-              <a:t>28.07.2020</a:t>
+              <a:t>04.08.2020</a:t>
             </a:fld>
             <a:endParaRPr lang="de-DE"/>
           </a:p>
@@ -965,7 +964,7 @@
           <a:p>
             <a:fld id="{A0D1225F-77B4-46FD-B8E4-473EB4FA812A}" type="datetime1">
               <a:rPr lang="de-DE" smtClean="0"/>
-              <a:t>28.07.2020</a:t>
+              <a:t>04.08.2020</a:t>
             </a:fld>
             <a:endParaRPr lang="de-DE"/>
           </a:p>
@@ -1145,7 +1144,7 @@
           <a:p>
             <a:fld id="{5C4BC0C7-1D30-4A69-888A-0F5592572663}" type="datetime1">
               <a:rPr lang="de-DE" smtClean="0"/>
-              <a:t>28.07.2020</a:t>
+              <a:t>04.08.2020</a:t>
             </a:fld>
             <a:endParaRPr lang="de-DE"/>
           </a:p>
@@ -1315,7 +1314,7 @@
           <a:p>
             <a:fld id="{D4F1D08F-6177-4955-9452-3C90214A54A8}" type="datetime1">
               <a:rPr lang="de-DE" smtClean="0"/>
-              <a:t>28.07.2020</a:t>
+              <a:t>04.08.2020</a:t>
             </a:fld>
             <a:endParaRPr lang="de-DE"/>
           </a:p>
@@ -1559,7 +1558,7 @@
           <a:p>
             <a:fld id="{7AB82801-C545-40FB-8926-400E9BD90B6B}" type="datetime1">
               <a:rPr lang="de-DE" smtClean="0"/>
-              <a:t>28.07.2020</a:t>
+              <a:t>04.08.2020</a:t>
             </a:fld>
             <a:endParaRPr lang="de-DE"/>
           </a:p>
@@ -1791,7 +1790,7 @@
           <a:p>
             <a:fld id="{F0BACEEF-F7F2-4E4C-A321-28E0D7311402}" type="datetime1">
               <a:rPr lang="de-DE" smtClean="0"/>
-              <a:t>28.07.2020</a:t>
+              <a:t>04.08.2020</a:t>
             </a:fld>
             <a:endParaRPr lang="de-DE"/>
           </a:p>
@@ -2158,7 +2157,7 @@
           <a:p>
             <a:fld id="{A484C36A-F96B-4869-ADF2-261100E42195}" type="datetime1">
               <a:rPr lang="de-DE" smtClean="0"/>
-              <a:t>28.07.2020</a:t>
+              <a:t>04.08.2020</a:t>
             </a:fld>
             <a:endParaRPr lang="de-DE"/>
           </a:p>
@@ -2276,7 +2275,7 @@
           <a:p>
             <a:fld id="{65B7DD95-1663-4B7F-B86E-569CF7413978}" type="datetime1">
               <a:rPr lang="de-DE" smtClean="0"/>
-              <a:t>28.07.2020</a:t>
+              <a:t>04.08.2020</a:t>
             </a:fld>
             <a:endParaRPr lang="de-DE"/>
           </a:p>
@@ -2371,7 +2370,7 @@
           <a:p>
             <a:fld id="{B325D364-C90A-47D3-B15E-B1507E97B3A6}" type="datetime1">
               <a:rPr lang="de-DE" smtClean="0"/>
-              <a:t>28.07.2020</a:t>
+              <a:t>04.08.2020</a:t>
             </a:fld>
             <a:endParaRPr lang="de-DE"/>
           </a:p>
@@ -2648,7 +2647,7 @@
           <a:p>
             <a:fld id="{4FBB9F33-DF52-4C91-AA86-E083BBD08D5F}" type="datetime1">
               <a:rPr lang="de-DE" smtClean="0"/>
-              <a:t>28.07.2020</a:t>
+              <a:t>04.08.2020</a:t>
             </a:fld>
             <a:endParaRPr lang="de-DE"/>
           </a:p>
@@ -2905,7 +2904,7 @@
           <a:p>
             <a:fld id="{C5336C09-58C1-4984-A05D-1290B7893020}" type="datetime1">
               <a:rPr lang="de-DE" smtClean="0"/>
-              <a:t>28.07.2020</a:t>
+              <a:t>04.08.2020</a:t>
             </a:fld>
             <a:endParaRPr lang="de-DE"/>
           </a:p>
@@ -3118,7 +3117,7 @@
           <a:p>
             <a:fld id="{426CE87E-C1E3-4CA4-81AD-6F514F88DC85}" type="datetime1">
               <a:rPr lang="de-DE" smtClean="0"/>
-              <a:t>28.07.2020</a:t>
+              <a:t>04.08.2020</a:t>
             </a:fld>
             <a:endParaRPr lang="de-DE"/>
           </a:p>
@@ -3648,8 +3647,8 @@
         </p:nvSpPr>
         <p:spPr>
           <a:xfrm>
-            <a:off x="2247076" y="7448853"/>
-            <a:ext cx="2363847" cy="1938992"/>
+            <a:off x="2065998" y="3880577"/>
+            <a:ext cx="3160984" cy="461665"/>
           </a:xfrm>
           <a:prstGeom prst="rect">
             <a:avLst/>
@@ -3664,22 +3663,8 @@
           <a:p>
             <a:pPr algn="ctr"/>
             <a:r>
-              <a:rPr lang="de-DE" sz="4000" dirty="0"/>
-              <a:t>Person A</a:t>
-            </a:r>
-          </a:p>
-          <a:p>
-            <a:pPr algn="ctr"/>
-            <a:r>
-              <a:rPr lang="de-DE" sz="4000" dirty="0"/>
-              <a:t>15</a:t>
-            </a:r>
-          </a:p>
-          <a:p>
-            <a:pPr algn="ctr"/>
-            <a:r>
-              <a:rPr lang="de-DE" sz="4000" dirty="0"/>
-              <a:t>front</a:t>
+              <a:rPr lang="de-DE" sz="2400" dirty="0"/>
+              <a:t>Person A	15	front</a:t>
             </a:r>
           </a:p>
         </p:txBody>
@@ -3712,14 +3697,86 @@
         </p:blipFill>
         <p:spPr>
           <a:xfrm>
-            <a:off x="0" y="0"/>
-            <a:ext cx="6858000" cy="6858000"/>
+            <a:off x="1442545" y="0"/>
+            <a:ext cx="3960000" cy="3960000"/>
           </a:xfrm>
           <a:prstGeom prst="rect">
             <a:avLst/>
           </a:prstGeom>
         </p:spPr>
       </p:pic>
+      <p:pic>
+        <p:nvPicPr>
+          <p:cNvPr id="4" name="Grafik 3">
+            <a:extLst>
+              <a:ext uri="{FF2B5EF4-FFF2-40B4-BE49-F238E27FC236}">
+                <a16:creationId xmlns:a16="http://schemas.microsoft.com/office/drawing/2014/main" id="{FFA3F301-CD27-4A16-B02A-05CB7824B000}"/>
+              </a:ext>
+            </a:extLst>
+          </p:cNvPr>
+          <p:cNvPicPr>
+            <a:picLocks noChangeAspect="1"/>
+          </p:cNvPicPr>
+          <p:nvPr/>
+        </p:nvPicPr>
+        <p:blipFill>
+          <a:blip r:embed="rId4">
+            <a:extLst>
+              <a:ext uri="{96DAC541-7B7A-43D3-8B79-37D633B846F1}">
+                <asvg:svgBlip xmlns:asvg="http://schemas.microsoft.com/office/drawing/2016/SVG/main" r:embed="rId5"/>
+              </a:ext>
+            </a:extLst>
+          </a:blip>
+          <a:stretch>
+            <a:fillRect/>
+          </a:stretch>
+        </p:blipFill>
+        <p:spPr>
+          <a:xfrm>
+            <a:off x="1526625" y="5186149"/>
+            <a:ext cx="3960000" cy="3960000"/>
+          </a:xfrm>
+          <a:prstGeom prst="rect">
+            <a:avLst/>
+          </a:prstGeom>
+        </p:spPr>
+      </p:pic>
+      <p:sp>
+        <p:nvSpPr>
+          <p:cNvPr id="7" name="Textfeld 6">
+            <a:extLst>
+              <a:ext uri="{FF2B5EF4-FFF2-40B4-BE49-F238E27FC236}">
+                <a16:creationId xmlns:a16="http://schemas.microsoft.com/office/drawing/2014/main" id="{21149027-1CF3-4C9F-B3EA-9CE27BE78AB7}"/>
+              </a:ext>
+            </a:extLst>
+          </p:cNvPr>
+          <p:cNvSpPr txBox="1"/>
+          <p:nvPr/>
+        </p:nvSpPr>
+        <p:spPr>
+          <a:xfrm>
+            <a:off x="1666490" y="9072577"/>
+            <a:ext cx="3960000" cy="461665"/>
+          </a:xfrm>
+          <a:prstGeom prst="rect">
+            <a:avLst/>
+          </a:prstGeom>
+          <a:noFill/>
+        </p:spPr>
+        <p:txBody>
+          <a:bodyPr wrap="square" rtlCol="0">
+            <a:spAutoFit/>
+          </a:bodyPr>
+          <a:lstStyle/>
+          <a:p>
+            <a:pPr algn="ctr"/>
+            <a:r>
+              <a:rPr lang="de-DE" sz="2400" dirty="0"/>
+              <a:t>Person A	16	back</a:t>
+            </a:r>
+          </a:p>
+        </p:txBody>
+      </p:sp>
     </p:spTree>
     <p:extLst>
       <p:ext uri="{BB962C8B-B14F-4D97-AF65-F5344CB8AC3E}">
@@ -3764,8 +3821,8 @@
         </p:nvSpPr>
         <p:spPr>
           <a:xfrm>
-            <a:off x="2205035" y="7522426"/>
-            <a:ext cx="2447930" cy="1938992"/>
+            <a:off x="2325904" y="7385791"/>
+            <a:ext cx="2206192" cy="1938992"/>
           </a:xfrm>
           <a:prstGeom prst="rect">
             <a:avLst/>
@@ -3788,15 +3845,16 @@
             <a:pPr algn="ctr"/>
             <a:r>
               <a:rPr lang="de-DE" sz="4000" dirty="0"/>
-              <a:t>16</a:t>
+              <a:t>17</a:t>
             </a:r>
           </a:p>
           <a:p>
             <a:pPr algn="ctr"/>
             <a:r>
-              <a:rPr lang="de-DE" sz="4000" dirty="0"/>
-              <a:t>back</a:t>
-            </a:r>
+              <a:rPr lang="de-DE" sz="4000" dirty="0" err="1"/>
+              <a:t>armraise</a:t>
+            </a:r>
+            <a:endParaRPr lang="de-DE" sz="4000" dirty="0"/>
           </a:p>
         </p:txBody>
       </p:sp>
@@ -3805,7 +3863,7 @@
           <p:cNvPr id="7" name="Grafik 6">
             <a:extLst>
               <a:ext uri="{FF2B5EF4-FFF2-40B4-BE49-F238E27FC236}">
-                <a16:creationId xmlns:a16="http://schemas.microsoft.com/office/drawing/2014/main" id="{D7FDC2CB-EFDD-4BEF-9F82-415F156AB154}"/>
+                <a16:creationId xmlns:a16="http://schemas.microsoft.com/office/drawing/2014/main" id="{83CFAE70-70EF-49A4-8699-C85C376F1A0A}"/>
               </a:ext>
             </a:extLst>
           </p:cNvPr>
@@ -3839,7 +3897,7 @@
     </p:spTree>
     <p:extLst>
       <p:ext uri="{BB962C8B-B14F-4D97-AF65-F5344CB8AC3E}">
-        <p14:creationId xmlns:p14="http://schemas.microsoft.com/office/powerpoint/2010/main" val="322069244"/>
+        <p14:creationId xmlns:p14="http://schemas.microsoft.com/office/powerpoint/2010/main" val="4275433167"/>
       </p:ext>
     </p:extLst>
   </p:cSld>
@@ -3880,123 +3938,6 @@
         </p:nvSpPr>
         <p:spPr>
           <a:xfrm>
-            <a:off x="2325904" y="7385791"/>
-            <a:ext cx="2206192" cy="1938992"/>
-          </a:xfrm>
-          <a:prstGeom prst="rect">
-            <a:avLst/>
-          </a:prstGeom>
-          <a:noFill/>
-        </p:spPr>
-        <p:txBody>
-          <a:bodyPr wrap="square" rtlCol="0">
-            <a:spAutoFit/>
-          </a:bodyPr>
-          <a:lstStyle/>
-          <a:p>
-            <a:pPr algn="ctr"/>
-            <a:r>
-              <a:rPr lang="de-DE" sz="4000" dirty="0"/>
-              <a:t>Person A</a:t>
-            </a:r>
-          </a:p>
-          <a:p>
-            <a:pPr algn="ctr"/>
-            <a:r>
-              <a:rPr lang="de-DE" sz="4000" dirty="0"/>
-              <a:t>17</a:t>
-            </a:r>
-          </a:p>
-          <a:p>
-            <a:pPr algn="ctr"/>
-            <a:r>
-              <a:rPr lang="de-DE" sz="4000" dirty="0" err="1"/>
-              <a:t>armraise</a:t>
-            </a:r>
-            <a:endParaRPr lang="de-DE" sz="4000" dirty="0"/>
-          </a:p>
-        </p:txBody>
-      </p:sp>
-      <p:pic>
-        <p:nvPicPr>
-          <p:cNvPr id="7" name="Grafik 6">
-            <a:extLst>
-              <a:ext uri="{FF2B5EF4-FFF2-40B4-BE49-F238E27FC236}">
-                <a16:creationId xmlns:a16="http://schemas.microsoft.com/office/drawing/2014/main" id="{83CFAE70-70EF-49A4-8699-C85C376F1A0A}"/>
-              </a:ext>
-            </a:extLst>
-          </p:cNvPr>
-          <p:cNvPicPr>
-            <a:picLocks noChangeAspect="1"/>
-          </p:cNvPicPr>
-          <p:nvPr/>
-        </p:nvPicPr>
-        <p:blipFill>
-          <a:blip r:embed="rId2">
-            <a:extLst>
-              <a:ext uri="{96DAC541-7B7A-43D3-8B79-37D633B846F1}">
-                <asvg:svgBlip xmlns:asvg="http://schemas.microsoft.com/office/drawing/2016/SVG/main" r:embed="rId3"/>
-              </a:ext>
-            </a:extLst>
-          </a:blip>
-          <a:stretch>
-            <a:fillRect/>
-          </a:stretch>
-        </p:blipFill>
-        <p:spPr>
-          <a:xfrm>
-            <a:off x="0" y="0"/>
-            <a:ext cx="6858000" cy="6858000"/>
-          </a:xfrm>
-          <a:prstGeom prst="rect">
-            <a:avLst/>
-          </a:prstGeom>
-        </p:spPr>
-      </p:pic>
-    </p:spTree>
-    <p:extLst>
-      <p:ext uri="{BB962C8B-B14F-4D97-AF65-F5344CB8AC3E}">
-        <p14:creationId xmlns:p14="http://schemas.microsoft.com/office/powerpoint/2010/main" val="4275433167"/>
-      </p:ext>
-    </p:extLst>
-  </p:cSld>
-  <p:clrMapOvr>
-    <a:masterClrMapping/>
-  </p:clrMapOvr>
-</p:sld>
-</file>
-
-<file path=ppt/slides/slide5.xml><?xml version="1.0" encoding="utf-8"?>
-<p:sld xmlns:a="http://schemas.openxmlformats.org/drawingml/2006/main" xmlns:r="http://schemas.openxmlformats.org/officeDocument/2006/relationships" xmlns:p="http://schemas.openxmlformats.org/presentationml/2006/main">
-  <p:cSld>
-    <p:spTree>
-      <p:nvGrpSpPr>
-        <p:cNvPr id="1" name=""/>
-        <p:cNvGrpSpPr/>
-        <p:nvPr/>
-      </p:nvGrpSpPr>
-      <p:grpSpPr>
-        <a:xfrm>
-          <a:off x="0" y="0"/>
-          <a:ext cx="0" cy="0"/>
-          <a:chOff x="0" y="0"/>
-          <a:chExt cx="0" cy="0"/>
-        </a:xfrm>
-      </p:grpSpPr>
-      <p:sp>
-        <p:nvSpPr>
-          <p:cNvPr id="6" name="Textfeld 5">
-            <a:extLst>
-              <a:ext uri="{FF2B5EF4-FFF2-40B4-BE49-F238E27FC236}">
-                <a16:creationId xmlns:a16="http://schemas.microsoft.com/office/drawing/2014/main" id="{981D819A-1DD5-4763-A764-846F0909A6E0}"/>
-              </a:ext>
-            </a:extLst>
-          </p:cNvPr>
-          <p:cNvSpPr txBox="1"/>
-          <p:nvPr/>
-        </p:nvSpPr>
-        <p:spPr>
-          <a:xfrm>
             <a:off x="2325904" y="2635114"/>
             <a:ext cx="2206192" cy="1938992"/>
           </a:xfrm>
@@ -4083,7 +4024,7 @@
 </p:sld>
 </file>
 
-<file path=ppt/slides/slide6.xml><?xml version="1.0" encoding="utf-8"?>
+<file path=ppt/slides/slide5.xml><?xml version="1.0" encoding="utf-8"?>
 <p:sld xmlns:a="http://schemas.openxmlformats.org/drawingml/2006/main" xmlns:r="http://schemas.openxmlformats.org/officeDocument/2006/relationships" xmlns:p="http://schemas.openxmlformats.org/presentationml/2006/main">
   <p:cSld>
     <p:spTree>
@@ -4440,7 +4381,7 @@
 </p:sld>
 </file>
 
-<file path=ppt/slides/slide7.xml><?xml version="1.0" encoding="utf-8"?>
+<file path=ppt/slides/slide6.xml><?xml version="1.0" encoding="utf-8"?>
 <p:sld xmlns:a="http://schemas.openxmlformats.org/drawingml/2006/main" xmlns:r="http://schemas.openxmlformats.org/officeDocument/2006/relationships" xmlns:p="http://schemas.openxmlformats.org/presentationml/2006/main">
   <p:cSld>
     <p:spTree>

</xml_diff>